<commit_message>
Commit before 2nd presentation
</commit_message>
<xml_diff>
--- a/2022182033_PROJECT_PRESENTATION_2.pptx
+++ b/2022182033_PROJECT_PRESENTATION_2.pptx
@@ -6,10 +6,7 @@
   </p:sldMasterIdLst>
   <p:sldIdLst>
     <p:sldId id="256" r:id="rId2"/>
-    <p:sldId id="257" r:id="rId3"/>
-    <p:sldId id="258" r:id="rId4"/>
-    <p:sldId id="259" r:id="rId5"/>
-    <p:sldId id="260" r:id="rId6"/>
+    <p:sldId id="260" r:id="rId3"/>
   </p:sldIdLst>
   <p:sldSz cx="12192000" cy="6858000"/>
   <p:notesSz cx="6858000" cy="9144000"/>
@@ -247,7 +244,7 @@
           <a:p>
             <a:fld id="{B6DCA27A-23E6-489C-8431-CBF0885F6EA1}" type="datetimeFigureOut">
               <a:rPr lang="ko-KR" altLang="en-US" smtClean="0"/>
-              <a:t>2025-09-29</a:t>
+              <a:t>2025-11-10</a:t>
             </a:fld>
             <a:endParaRPr lang="ko-KR" altLang="en-US"/>
           </a:p>
@@ -417,7 +414,7 @@
           <a:p>
             <a:fld id="{B6DCA27A-23E6-489C-8431-CBF0885F6EA1}" type="datetimeFigureOut">
               <a:rPr lang="ko-KR" altLang="en-US" smtClean="0"/>
-              <a:t>2025-09-29</a:t>
+              <a:t>2025-11-10</a:t>
             </a:fld>
             <a:endParaRPr lang="ko-KR" altLang="en-US"/>
           </a:p>
@@ -597,7 +594,7 @@
           <a:p>
             <a:fld id="{B6DCA27A-23E6-489C-8431-CBF0885F6EA1}" type="datetimeFigureOut">
               <a:rPr lang="ko-KR" altLang="en-US" smtClean="0"/>
-              <a:t>2025-09-29</a:t>
+              <a:t>2025-11-10</a:t>
             </a:fld>
             <a:endParaRPr lang="ko-KR" altLang="en-US"/>
           </a:p>
@@ -767,7 +764,7 @@
           <a:p>
             <a:fld id="{B6DCA27A-23E6-489C-8431-CBF0885F6EA1}" type="datetimeFigureOut">
               <a:rPr lang="ko-KR" altLang="en-US" smtClean="0"/>
-              <a:t>2025-09-29</a:t>
+              <a:t>2025-11-10</a:t>
             </a:fld>
             <a:endParaRPr lang="ko-KR" altLang="en-US"/>
           </a:p>
@@ -1013,7 +1010,7 @@
           <a:p>
             <a:fld id="{B6DCA27A-23E6-489C-8431-CBF0885F6EA1}" type="datetimeFigureOut">
               <a:rPr lang="ko-KR" altLang="en-US" smtClean="0"/>
-              <a:t>2025-09-29</a:t>
+              <a:t>2025-11-10</a:t>
             </a:fld>
             <a:endParaRPr lang="ko-KR" altLang="en-US"/>
           </a:p>
@@ -1245,7 +1242,7 @@
           <a:p>
             <a:fld id="{B6DCA27A-23E6-489C-8431-CBF0885F6EA1}" type="datetimeFigureOut">
               <a:rPr lang="ko-KR" altLang="en-US" smtClean="0"/>
-              <a:t>2025-09-29</a:t>
+              <a:t>2025-11-10</a:t>
             </a:fld>
             <a:endParaRPr lang="ko-KR" altLang="en-US"/>
           </a:p>
@@ -1612,7 +1609,7 @@
           <a:p>
             <a:fld id="{B6DCA27A-23E6-489C-8431-CBF0885F6EA1}" type="datetimeFigureOut">
               <a:rPr lang="ko-KR" altLang="en-US" smtClean="0"/>
-              <a:t>2025-09-29</a:t>
+              <a:t>2025-11-10</a:t>
             </a:fld>
             <a:endParaRPr lang="ko-KR" altLang="en-US"/>
           </a:p>
@@ -1730,7 +1727,7 @@
           <a:p>
             <a:fld id="{B6DCA27A-23E6-489C-8431-CBF0885F6EA1}" type="datetimeFigureOut">
               <a:rPr lang="ko-KR" altLang="en-US" smtClean="0"/>
-              <a:t>2025-09-29</a:t>
+              <a:t>2025-11-10</a:t>
             </a:fld>
             <a:endParaRPr lang="ko-KR" altLang="en-US"/>
           </a:p>
@@ -1825,7 +1822,7 @@
           <a:p>
             <a:fld id="{B6DCA27A-23E6-489C-8431-CBF0885F6EA1}" type="datetimeFigureOut">
               <a:rPr lang="ko-KR" altLang="en-US" smtClean="0"/>
-              <a:t>2025-09-29</a:t>
+              <a:t>2025-11-10</a:t>
             </a:fld>
             <a:endParaRPr lang="ko-KR" altLang="en-US"/>
           </a:p>
@@ -2102,7 +2099,7 @@
           <a:p>
             <a:fld id="{B6DCA27A-23E6-489C-8431-CBF0885F6EA1}" type="datetimeFigureOut">
               <a:rPr lang="ko-KR" altLang="en-US" smtClean="0"/>
-              <a:t>2025-09-29</a:t>
+              <a:t>2025-11-10</a:t>
             </a:fld>
             <a:endParaRPr lang="ko-KR" altLang="en-US"/>
           </a:p>
@@ -2359,7 +2356,7 @@
           <a:p>
             <a:fld id="{B6DCA27A-23E6-489C-8431-CBF0885F6EA1}" type="datetimeFigureOut">
               <a:rPr lang="ko-KR" altLang="en-US" smtClean="0"/>
-              <a:t>2025-09-29</a:t>
+              <a:t>2025-11-10</a:t>
             </a:fld>
             <a:endParaRPr lang="ko-KR" altLang="en-US"/>
           </a:p>
@@ -2572,7 +2569,7 @@
           <a:p>
             <a:fld id="{B6DCA27A-23E6-489C-8431-CBF0885F6EA1}" type="datetimeFigureOut">
               <a:rPr lang="ko-KR" altLang="en-US" smtClean="0"/>
-              <a:t>2025-09-29</a:t>
+              <a:t>2025-11-10</a:t>
             </a:fld>
             <a:endParaRPr lang="ko-KR" altLang="en-US"/>
           </a:p>
@@ -3037,7 +3034,7 @@
           <a:p>
             <a:r>
               <a:rPr lang="en-US" altLang="ko-KR" sz="3000" dirty="0"/>
-              <a:t>1</a:t>
+              <a:t>2</a:t>
             </a:r>
             <a:r>
               <a:rPr lang="ko-KR" altLang="en-US" sz="3000" dirty="0"/>
@@ -3074,851 +3071,6 @@
 </file>
 
 <file path=ppt/slides/slide2.xml><?xml version="1.0" encoding="utf-8"?>
-<p:sld xmlns:a="http://schemas.openxmlformats.org/drawingml/2006/main" xmlns:r="http://schemas.openxmlformats.org/officeDocument/2006/relationships" xmlns:p="http://schemas.openxmlformats.org/presentationml/2006/main">
-  <p:cSld>
-    <p:spTree>
-      <p:nvGrpSpPr>
-        <p:cNvPr id="1" name=""/>
-        <p:cNvGrpSpPr/>
-        <p:nvPr/>
-      </p:nvGrpSpPr>
-      <p:grpSpPr>
-        <a:xfrm>
-          <a:off x="0" y="0"/>
-          <a:ext cx="0" cy="0"/>
-          <a:chOff x="0" y="0"/>
-          <a:chExt cx="0" cy="0"/>
-        </a:xfrm>
-      </p:grpSpPr>
-      <p:sp>
-        <p:nvSpPr>
-          <p:cNvPr id="2" name="제목 1">
-            <a:extLst>
-              <a:ext uri="{FF2B5EF4-FFF2-40B4-BE49-F238E27FC236}">
-                <a16:creationId xmlns:a16="http://schemas.microsoft.com/office/drawing/2014/main" id="{DB2D0841-7665-E9A0-EE99-5709A24FF959}"/>
-              </a:ext>
-            </a:extLst>
-          </p:cNvPr>
-          <p:cNvSpPr>
-            <a:spLocks noGrp="1"/>
-          </p:cNvSpPr>
-          <p:nvPr>
-            <p:ph type="title"/>
-          </p:nvPr>
-        </p:nvSpPr>
-        <p:spPr/>
-        <p:txBody>
-          <a:bodyPr/>
-          <a:lstStyle/>
-          <a:p>
-            <a:pPr algn="ctr"/>
-            <a:r>
-              <a:rPr lang="en-US" altLang="ko-KR" dirty="0"/>
-              <a:t>[</a:t>
-            </a:r>
-            <a:r>
-              <a:rPr lang="ko-KR" altLang="en-US" dirty="0"/>
-              <a:t>게임 컨셉</a:t>
-            </a:r>
-            <a:r>
-              <a:rPr lang="en-US" altLang="ko-KR" dirty="0"/>
-              <a:t>]</a:t>
-            </a:r>
-            <a:endParaRPr lang="ko-KR" altLang="en-US" dirty="0"/>
-          </a:p>
-        </p:txBody>
-      </p:sp>
-      <p:sp>
-        <p:nvSpPr>
-          <p:cNvPr id="3" name="내용 개체 틀 2">
-            <a:extLst>
-              <a:ext uri="{FF2B5EF4-FFF2-40B4-BE49-F238E27FC236}">
-                <a16:creationId xmlns:a16="http://schemas.microsoft.com/office/drawing/2014/main" id="{26478B79-F6BC-18D3-DF2A-6CA2A64964AF}"/>
-              </a:ext>
-            </a:extLst>
-          </p:cNvPr>
-          <p:cNvSpPr>
-            <a:spLocks noGrp="1"/>
-          </p:cNvSpPr>
-          <p:nvPr>
-            <p:ph idx="1"/>
-          </p:nvPr>
-        </p:nvSpPr>
-        <p:spPr/>
-        <p:txBody>
-          <a:bodyPr/>
-          <a:lstStyle/>
-          <a:p>
-            <a:pPr marL="0" indent="0">
-              <a:buNone/>
-            </a:pPr>
-            <a:r>
-              <a:rPr lang="ko-KR" altLang="en-US" sz="3200" dirty="0"/>
-              <a:t>핵심 컨셉</a:t>
-            </a:r>
-            <a:endParaRPr lang="en-US" altLang="ko-KR" sz="3200" dirty="0"/>
-          </a:p>
-          <a:p>
-            <a:pPr marL="0" indent="0">
-              <a:buNone/>
-            </a:pPr>
-            <a:r>
-              <a:rPr lang="en-US" altLang="ko-KR" sz="2000" dirty="0"/>
-              <a:t>- </a:t>
-            </a:r>
-            <a:r>
-              <a:rPr lang="ko-KR" altLang="en-US" sz="2000" dirty="0"/>
-              <a:t>좀비들로 인해 폐건물이 된 연구소에서 </a:t>
-            </a:r>
-            <a:r>
-              <a:rPr lang="ko-KR" altLang="en-US" sz="2000" dirty="0">
-                <a:solidFill>
-                  <a:srgbClr val="99FF33"/>
-                </a:solidFill>
-              </a:rPr>
-              <a:t>백신</a:t>
-            </a:r>
-            <a:r>
-              <a:rPr lang="ko-KR" altLang="en-US" sz="2000" dirty="0"/>
-              <a:t>을 찾아서 안전하게 탈출하는 성장 </a:t>
-            </a:r>
-            <a:r>
-              <a:rPr lang="en-US" altLang="ko-KR" sz="2000" dirty="0"/>
-              <a:t>RPG</a:t>
-            </a:r>
-          </a:p>
-          <a:p>
-            <a:pPr marL="0" indent="0">
-              <a:buNone/>
-            </a:pPr>
-            <a:endParaRPr lang="en-US" altLang="ko-KR" sz="2000" dirty="0"/>
-          </a:p>
-          <a:p>
-            <a:pPr marL="0" indent="0">
-              <a:buNone/>
-            </a:pPr>
-            <a:r>
-              <a:rPr lang="ko-KR" altLang="en-US" sz="3200" dirty="0"/>
-              <a:t>재미 요소</a:t>
-            </a:r>
-            <a:endParaRPr lang="en-US" altLang="ko-KR" sz="3200" dirty="0"/>
-          </a:p>
-          <a:p>
-            <a:pPr>
-              <a:buFontTx/>
-              <a:buChar char="-"/>
-            </a:pPr>
-            <a:r>
-              <a:rPr lang="ko-KR" altLang="en-US" sz="2000" dirty="0"/>
-              <a:t>주변만 볼 수 있게 하는 </a:t>
-            </a:r>
-            <a:r>
-              <a:rPr lang="ko-KR" altLang="en-US" sz="2000" dirty="0" err="1"/>
-              <a:t>후레쉬</a:t>
-            </a:r>
-            <a:r>
-              <a:rPr lang="ko-KR" altLang="en-US" sz="2000" dirty="0"/>
-              <a:t> 하나로 공포 분위기 조성</a:t>
-            </a:r>
-            <a:endParaRPr lang="en-US" altLang="ko-KR" sz="2000" dirty="0"/>
-          </a:p>
-          <a:p>
-            <a:pPr>
-              <a:buFontTx/>
-              <a:buChar char="-"/>
-            </a:pPr>
-            <a:r>
-              <a:rPr lang="ko-KR" altLang="en-US" sz="2000" dirty="0"/>
-              <a:t>다양한 바이러스 변이가 존재함으로써 각 좀비의 능력이 다르다</a:t>
-            </a:r>
-            <a:endParaRPr lang="en-US" altLang="ko-KR" sz="2000" dirty="0"/>
-          </a:p>
-          <a:p>
-            <a:pPr>
-              <a:buFontTx/>
-              <a:buChar char="-"/>
-            </a:pPr>
-            <a:r>
-              <a:rPr lang="ko-KR" altLang="en-US" sz="2000" dirty="0"/>
-              <a:t>플레이어가 얻을 수 있는 스킬</a:t>
-            </a:r>
-            <a:r>
-              <a:rPr lang="en-US" altLang="ko-KR" sz="2000" dirty="0"/>
-              <a:t>(</a:t>
-            </a:r>
-            <a:r>
-              <a:rPr lang="ko-KR" altLang="en-US" sz="2000" dirty="0"/>
-              <a:t>은신</a:t>
-            </a:r>
-            <a:r>
-              <a:rPr lang="en-US" altLang="ko-KR" sz="2000" dirty="0"/>
-              <a:t>, </a:t>
-            </a:r>
-            <a:r>
-              <a:rPr lang="ko-KR" altLang="en-US" sz="2000" dirty="0"/>
-              <a:t>장거리 </a:t>
-            </a:r>
-            <a:r>
-              <a:rPr lang="ko-KR" altLang="en-US" sz="2000" dirty="0" err="1"/>
-              <a:t>후레쉬</a:t>
-            </a:r>
-            <a:r>
-              <a:rPr lang="ko-KR" altLang="en-US" sz="2000" dirty="0"/>
-              <a:t> 등</a:t>
-            </a:r>
-            <a:r>
-              <a:rPr lang="en-US" altLang="ko-KR" sz="2000" dirty="0"/>
-              <a:t>)</a:t>
-            </a:r>
-            <a:r>
-              <a:rPr lang="ko-KR" altLang="en-US" sz="2000" dirty="0"/>
-              <a:t>을 이용하여 성장</a:t>
-            </a:r>
-            <a:endParaRPr lang="en-US" altLang="ko-KR" sz="2000" dirty="0"/>
-          </a:p>
-          <a:p>
-            <a:pPr>
-              <a:buFontTx/>
-              <a:buChar char="-"/>
-            </a:pPr>
-            <a:endParaRPr lang="en-US" altLang="ko-KR" sz="2000" dirty="0"/>
-          </a:p>
-          <a:p>
-            <a:pPr marL="0" indent="0">
-              <a:buNone/>
-            </a:pPr>
-            <a:endParaRPr lang="ko-KR" altLang="en-US" sz="2000" dirty="0"/>
-          </a:p>
-        </p:txBody>
-      </p:sp>
-    </p:spTree>
-    <p:extLst>
-      <p:ext uri="{BB962C8B-B14F-4D97-AF65-F5344CB8AC3E}">
-        <p14:creationId xmlns:p14="http://schemas.microsoft.com/office/powerpoint/2010/main" val="1475110505"/>
-      </p:ext>
-    </p:extLst>
-  </p:cSld>
-  <p:clrMapOvr>
-    <a:masterClrMapping/>
-  </p:clrMapOvr>
-</p:sld>
-</file>
-
-<file path=ppt/slides/slide3.xml><?xml version="1.0" encoding="utf-8"?>
-<p:sld xmlns:a="http://schemas.openxmlformats.org/drawingml/2006/main" xmlns:r="http://schemas.openxmlformats.org/officeDocument/2006/relationships" xmlns:p="http://schemas.openxmlformats.org/presentationml/2006/main">
-  <p:cSld>
-    <p:spTree>
-      <p:nvGrpSpPr>
-        <p:cNvPr id="1" name="">
-          <a:extLst>
-            <a:ext uri="{FF2B5EF4-FFF2-40B4-BE49-F238E27FC236}">
-              <a16:creationId xmlns:a16="http://schemas.microsoft.com/office/drawing/2014/main" id="{0699E32E-C7E7-6750-D17F-DC1E5E2915FB}"/>
-            </a:ext>
-          </a:extLst>
-        </p:cNvPr>
-        <p:cNvGrpSpPr/>
-        <p:nvPr/>
-      </p:nvGrpSpPr>
-      <p:grpSpPr>
-        <a:xfrm>
-          <a:off x="0" y="0"/>
-          <a:ext cx="0" cy="0"/>
-          <a:chOff x="0" y="0"/>
-          <a:chExt cx="0" cy="0"/>
-        </a:xfrm>
-      </p:grpSpPr>
-      <p:sp>
-        <p:nvSpPr>
-          <p:cNvPr id="2" name="제목 1">
-            <a:extLst>
-              <a:ext uri="{FF2B5EF4-FFF2-40B4-BE49-F238E27FC236}">
-                <a16:creationId xmlns:a16="http://schemas.microsoft.com/office/drawing/2014/main" id="{BE721C5A-AD34-AF53-0C7E-F1B7F97D268E}"/>
-              </a:ext>
-            </a:extLst>
-          </p:cNvPr>
-          <p:cNvSpPr>
-            <a:spLocks noGrp="1"/>
-          </p:cNvSpPr>
-          <p:nvPr>
-            <p:ph type="title"/>
-          </p:nvPr>
-        </p:nvSpPr>
-        <p:spPr/>
-        <p:txBody>
-          <a:bodyPr/>
-          <a:lstStyle/>
-          <a:p>
-            <a:pPr algn="ctr"/>
-            <a:r>
-              <a:rPr lang="en-US" altLang="ko-KR" dirty="0"/>
-              <a:t>[</a:t>
-            </a:r>
-            <a:r>
-              <a:rPr lang="ko-KR" altLang="en-US" dirty="0"/>
-              <a:t>게임 진행 흐름</a:t>
-            </a:r>
-            <a:r>
-              <a:rPr lang="en-US" altLang="ko-KR" dirty="0"/>
-              <a:t>]</a:t>
-            </a:r>
-            <a:endParaRPr lang="ko-KR" altLang="en-US" dirty="0"/>
-          </a:p>
-        </p:txBody>
-      </p:sp>
-      <p:sp>
-        <p:nvSpPr>
-          <p:cNvPr id="3" name="내용 개체 틀 2">
-            <a:extLst>
-              <a:ext uri="{FF2B5EF4-FFF2-40B4-BE49-F238E27FC236}">
-                <a16:creationId xmlns:a16="http://schemas.microsoft.com/office/drawing/2014/main" id="{D825F5A5-61A9-DF91-C885-00137FF32A10}"/>
-              </a:ext>
-            </a:extLst>
-          </p:cNvPr>
-          <p:cNvSpPr>
-            <a:spLocks noGrp="1"/>
-          </p:cNvSpPr>
-          <p:nvPr>
-            <p:ph idx="1"/>
-          </p:nvPr>
-        </p:nvSpPr>
-        <p:spPr/>
-        <p:txBody>
-          <a:bodyPr/>
-          <a:lstStyle/>
-          <a:p>
-            <a:pPr>
-              <a:buFontTx/>
-              <a:buChar char="-"/>
-            </a:pPr>
-            <a:r>
-              <a:rPr lang="ko-KR" altLang="en-US" sz="2000" dirty="0"/>
-              <a:t>게임 시작</a:t>
-            </a:r>
-            <a:endParaRPr lang="en-US" altLang="ko-KR" sz="2000" dirty="0"/>
-          </a:p>
-          <a:p>
-            <a:pPr marL="0" indent="0">
-              <a:buNone/>
-            </a:pPr>
-            <a:r>
-              <a:rPr lang="en-US" altLang="ko-KR" sz="2000" dirty="0"/>
-              <a:t>    </a:t>
-            </a:r>
-            <a:r>
-              <a:rPr lang="ko-KR" altLang="en-US" sz="2000" dirty="0"/>
-              <a:t>연구소 밖에서 </a:t>
-            </a:r>
-            <a:r>
-              <a:rPr lang="ko-KR" altLang="en-US" sz="2000" dirty="0" err="1"/>
-              <a:t>스폰하여</a:t>
-            </a:r>
-            <a:r>
-              <a:rPr lang="ko-KR" altLang="en-US" sz="2000" dirty="0"/>
-              <a:t> 건물 내에 들어가는 </a:t>
-            </a:r>
-            <a:endParaRPr lang="en-US" altLang="ko-KR" sz="2000" dirty="0"/>
-          </a:p>
-          <a:p>
-            <a:pPr marL="0" indent="0">
-              <a:buNone/>
-            </a:pPr>
-            <a:r>
-              <a:rPr lang="en-US" altLang="ko-KR" sz="2000" dirty="0"/>
-              <a:t>    </a:t>
-            </a:r>
-            <a:r>
-              <a:rPr lang="ko-KR" altLang="en-US" sz="2000" dirty="0"/>
-              <a:t>순간 게임의 시작이다</a:t>
-            </a:r>
-            <a:endParaRPr lang="en-US" altLang="ko-KR" sz="2000" dirty="0"/>
-          </a:p>
-          <a:p>
-            <a:pPr marL="0" indent="0">
-              <a:buNone/>
-            </a:pPr>
-            <a:endParaRPr lang="en-US" altLang="ko-KR" sz="2000" dirty="0"/>
-          </a:p>
-          <a:p>
-            <a:pPr>
-              <a:buFontTx/>
-              <a:buChar char="-"/>
-            </a:pPr>
-            <a:r>
-              <a:rPr lang="ko-KR" altLang="en-US" sz="2000" dirty="0"/>
-              <a:t>건물 구조 </a:t>
-            </a:r>
-            <a:endParaRPr lang="en-US" altLang="ko-KR" sz="2000" dirty="0"/>
-          </a:p>
-          <a:p>
-            <a:pPr marL="0" indent="0">
-              <a:buNone/>
-            </a:pPr>
-            <a:r>
-              <a:rPr lang="en-US" altLang="ko-KR" sz="2000" dirty="0"/>
-              <a:t>     </a:t>
-            </a:r>
-            <a:r>
-              <a:rPr lang="ko-KR" altLang="en-US" sz="2000" dirty="0"/>
-              <a:t>여러 실험실이 존재하며 </a:t>
-            </a:r>
-            <a:r>
-              <a:rPr lang="en-US" altLang="ko-KR" sz="2000" dirty="0"/>
-              <a:t>1</a:t>
-            </a:r>
-            <a:r>
-              <a:rPr lang="ko-KR" altLang="en-US" sz="2000" dirty="0"/>
-              <a:t>층 </a:t>
-            </a:r>
-            <a:r>
-              <a:rPr lang="en-US" altLang="ko-KR" sz="2000" dirty="0"/>
-              <a:t>~ 3</a:t>
-            </a:r>
-            <a:r>
-              <a:rPr lang="ko-KR" altLang="en-US" sz="2000" dirty="0"/>
-              <a:t>층까지 있다</a:t>
-            </a:r>
-            <a:endParaRPr lang="en-US" altLang="ko-KR" sz="2000" dirty="0"/>
-          </a:p>
-          <a:p>
-            <a:pPr marL="0" indent="0">
-              <a:buNone/>
-            </a:pPr>
-            <a:endParaRPr lang="en-US" altLang="ko-KR" sz="2000" dirty="0"/>
-          </a:p>
-          <a:p>
-            <a:pPr>
-              <a:buFontTx/>
-              <a:buChar char="-"/>
-            </a:pPr>
-            <a:r>
-              <a:rPr lang="ko-KR" altLang="en-US" sz="2000" dirty="0"/>
-              <a:t>승리 조건</a:t>
-            </a:r>
-            <a:endParaRPr lang="en-US" altLang="ko-KR" sz="2000" dirty="0"/>
-          </a:p>
-          <a:p>
-            <a:pPr marL="0" indent="0">
-              <a:buNone/>
-            </a:pPr>
-            <a:r>
-              <a:rPr lang="en-US" altLang="ko-KR" sz="2000" dirty="0"/>
-              <a:t>    </a:t>
-            </a:r>
-            <a:r>
-              <a:rPr lang="ko-KR" altLang="en-US" sz="2000" dirty="0"/>
-              <a:t>건물 내 랜덤 위치에 있는 백신을 찾아 탈출 </a:t>
-            </a:r>
-            <a:endParaRPr lang="en-US" altLang="ko-KR" sz="2000" dirty="0"/>
-          </a:p>
-        </p:txBody>
-      </p:sp>
-      <p:pic>
-        <p:nvPicPr>
-          <p:cNvPr id="5" name="그림 4" descr="집, 창문, 건물, 스크린샷이(가) 표시된 사진&#10;&#10;AI 생성 콘텐츠는 정확하지 않을 수 있습니다.">
-            <a:extLst>
-              <a:ext uri="{FF2B5EF4-FFF2-40B4-BE49-F238E27FC236}">
-                <a16:creationId xmlns:a16="http://schemas.microsoft.com/office/drawing/2014/main" id="{EA02A32F-A26B-CD30-50B1-E7DB3B6D066C}"/>
-              </a:ext>
-            </a:extLst>
-          </p:cNvPr>
-          <p:cNvPicPr>
-            <a:picLocks noChangeAspect="1"/>
-          </p:cNvPicPr>
-          <p:nvPr/>
-        </p:nvPicPr>
-        <p:blipFill>
-          <a:blip r:embed="rId2">
-            <a:extLst>
-              <a:ext uri="{28A0092B-C50C-407E-A947-70E740481C1C}">
-                <a14:useLocalDpi xmlns:a14="http://schemas.microsoft.com/office/drawing/2010/main" val="0"/>
-              </a:ext>
-            </a:extLst>
-          </a:blip>
-          <a:stretch>
-            <a:fillRect/>
-          </a:stretch>
-        </p:blipFill>
-        <p:spPr>
-          <a:xfrm>
-            <a:off x="6194136" y="1565707"/>
-            <a:ext cx="5715000" cy="3190875"/>
-          </a:xfrm>
-          <a:prstGeom prst="rect">
-            <a:avLst/>
-          </a:prstGeom>
-        </p:spPr>
-      </p:pic>
-    </p:spTree>
-    <p:extLst>
-      <p:ext uri="{BB962C8B-B14F-4D97-AF65-F5344CB8AC3E}">
-        <p14:creationId xmlns:p14="http://schemas.microsoft.com/office/powerpoint/2010/main" val="2515065079"/>
-      </p:ext>
-    </p:extLst>
-  </p:cSld>
-  <p:clrMapOvr>
-    <a:masterClrMapping/>
-  </p:clrMapOvr>
-</p:sld>
-</file>
-
-<file path=ppt/slides/slide4.xml><?xml version="1.0" encoding="utf-8"?>
-<p:sld xmlns:a="http://schemas.openxmlformats.org/drawingml/2006/main" xmlns:r="http://schemas.openxmlformats.org/officeDocument/2006/relationships" xmlns:p="http://schemas.openxmlformats.org/presentationml/2006/main">
-  <p:cSld>
-    <p:spTree>
-      <p:nvGrpSpPr>
-        <p:cNvPr id="1" name="">
-          <a:extLst>
-            <a:ext uri="{FF2B5EF4-FFF2-40B4-BE49-F238E27FC236}">
-              <a16:creationId xmlns:a16="http://schemas.microsoft.com/office/drawing/2014/main" id="{7F573FF6-A3FB-28BB-8A77-21DBA2817BBA}"/>
-            </a:ext>
-          </a:extLst>
-        </p:cNvPr>
-        <p:cNvGrpSpPr/>
-        <p:nvPr/>
-      </p:nvGrpSpPr>
-      <p:grpSpPr>
-        <a:xfrm>
-          <a:off x="0" y="0"/>
-          <a:ext cx="0" cy="0"/>
-          <a:chOff x="0" y="0"/>
-          <a:chExt cx="0" cy="0"/>
-        </a:xfrm>
-      </p:grpSpPr>
-      <p:pic>
-        <p:nvPicPr>
-          <p:cNvPr id="7" name="그림 6" descr="스크린샷, 직사각형이(가) 표시된 사진&#10;&#10;AI 생성 콘텐츠는 정확하지 않을 수 있습니다.">
-            <a:extLst>
-              <a:ext uri="{FF2B5EF4-FFF2-40B4-BE49-F238E27FC236}">
-                <a16:creationId xmlns:a16="http://schemas.microsoft.com/office/drawing/2014/main" id="{C1B21B20-5AF0-C33B-C104-E7D84633123D}"/>
-              </a:ext>
-            </a:extLst>
-          </p:cNvPr>
-          <p:cNvPicPr>
-            <a:picLocks noChangeAspect="1"/>
-          </p:cNvPicPr>
-          <p:nvPr/>
-        </p:nvPicPr>
-        <p:blipFill>
-          <a:blip r:embed="rId2">
-            <a:extLst>
-              <a:ext uri="{28A0092B-C50C-407E-A947-70E740481C1C}">
-                <a14:useLocalDpi xmlns:a14="http://schemas.microsoft.com/office/drawing/2010/main" val="0"/>
-              </a:ext>
-            </a:extLst>
-          </a:blip>
-          <a:stretch>
-            <a:fillRect/>
-          </a:stretch>
-        </p:blipFill>
-        <p:spPr>
-          <a:xfrm>
-            <a:off x="5690192" y="1500339"/>
-            <a:ext cx="6280984" cy="4134414"/>
-          </a:xfrm>
-          <a:prstGeom prst="rect">
-            <a:avLst/>
-          </a:prstGeom>
-        </p:spPr>
-      </p:pic>
-      <p:sp>
-        <p:nvSpPr>
-          <p:cNvPr id="2" name="제목 1">
-            <a:extLst>
-              <a:ext uri="{FF2B5EF4-FFF2-40B4-BE49-F238E27FC236}">
-                <a16:creationId xmlns:a16="http://schemas.microsoft.com/office/drawing/2014/main" id="{06866495-30E7-3984-2BBF-784F5D871FB3}"/>
-              </a:ext>
-            </a:extLst>
-          </p:cNvPr>
-          <p:cNvSpPr>
-            <a:spLocks noGrp="1"/>
-          </p:cNvSpPr>
-          <p:nvPr>
-            <p:ph type="title"/>
-          </p:nvPr>
-        </p:nvSpPr>
-        <p:spPr/>
-        <p:txBody>
-          <a:bodyPr/>
-          <a:lstStyle/>
-          <a:p>
-            <a:pPr algn="ctr"/>
-            <a:r>
-              <a:rPr lang="en-US" altLang="ko-KR" dirty="0"/>
-              <a:t>[</a:t>
-            </a:r>
-            <a:r>
-              <a:rPr lang="ko-KR" altLang="en-US" dirty="0"/>
-              <a:t>게임 진행 흐름</a:t>
-            </a:r>
-            <a:r>
-              <a:rPr lang="en-US" altLang="ko-KR" dirty="0"/>
-              <a:t>]</a:t>
-            </a:r>
-            <a:endParaRPr lang="ko-KR" altLang="en-US" dirty="0"/>
-          </a:p>
-        </p:txBody>
-      </p:sp>
-      <p:sp>
-        <p:nvSpPr>
-          <p:cNvPr id="3" name="내용 개체 틀 2">
-            <a:extLst>
-              <a:ext uri="{FF2B5EF4-FFF2-40B4-BE49-F238E27FC236}">
-                <a16:creationId xmlns:a16="http://schemas.microsoft.com/office/drawing/2014/main" id="{E72132AF-7807-0F05-6379-E5D986A1195F}"/>
-              </a:ext>
-            </a:extLst>
-          </p:cNvPr>
-          <p:cNvSpPr>
-            <a:spLocks noGrp="1"/>
-          </p:cNvSpPr>
-          <p:nvPr>
-            <p:ph idx="1"/>
-          </p:nvPr>
-        </p:nvSpPr>
-        <p:spPr>
-          <a:xfrm>
-            <a:off x="838200" y="1825624"/>
-            <a:ext cx="10515600" cy="4855093"/>
-          </a:xfrm>
-        </p:spPr>
-        <p:txBody>
-          <a:bodyPr>
-            <a:normAutofit/>
-          </a:bodyPr>
-          <a:lstStyle/>
-          <a:p>
-            <a:pPr>
-              <a:buFontTx/>
-              <a:buChar char="-"/>
-            </a:pPr>
-            <a:r>
-              <a:rPr lang="ko-KR" altLang="en-US" sz="2000" dirty="0">
-                <a:solidFill>
-                  <a:srgbClr val="99FF33"/>
-                </a:solidFill>
-              </a:rPr>
-              <a:t>백신</a:t>
-            </a:r>
-            <a:endParaRPr lang="en-US" altLang="ko-KR" sz="2000" dirty="0">
-              <a:solidFill>
-                <a:srgbClr val="99FF33"/>
-              </a:solidFill>
-            </a:endParaRPr>
-          </a:p>
-          <a:p>
-            <a:pPr marL="0" indent="0">
-              <a:buNone/>
-            </a:pPr>
-            <a:r>
-              <a:rPr lang="en-US" altLang="ko-KR" sz="2000" dirty="0"/>
-              <a:t>    1 ~ 3</a:t>
-            </a:r>
-            <a:r>
-              <a:rPr lang="ko-KR" altLang="en-US" sz="2000" dirty="0"/>
-              <a:t>층 실험실 중 랜덤하게 배치가 된다</a:t>
-            </a:r>
-            <a:endParaRPr lang="en-US" altLang="ko-KR" sz="2000" dirty="0"/>
-          </a:p>
-          <a:p>
-            <a:pPr marL="0" indent="0">
-              <a:buNone/>
-            </a:pPr>
-            <a:r>
-              <a:rPr lang="en-US" altLang="ko-KR" sz="2000" dirty="0"/>
-              <a:t>    </a:t>
-            </a:r>
-            <a:r>
-              <a:rPr lang="ko-KR" altLang="en-US" sz="2000" dirty="0"/>
-              <a:t>초록색으로 밝게 표시가 되어 있다</a:t>
-            </a:r>
-            <a:endParaRPr lang="en-US" altLang="ko-KR" sz="2000" dirty="0"/>
-          </a:p>
-          <a:p>
-            <a:pPr marL="0" indent="0">
-              <a:buNone/>
-            </a:pPr>
-            <a:endParaRPr lang="en-US" altLang="ko-KR" sz="2000" dirty="0"/>
-          </a:p>
-          <a:p>
-            <a:pPr>
-              <a:buFontTx/>
-              <a:buChar char="-"/>
-            </a:pPr>
-            <a:r>
-              <a:rPr lang="ko-KR" altLang="en-US" sz="2000" dirty="0"/>
-              <a:t>스킬 </a:t>
-            </a:r>
-            <a:endParaRPr lang="en-US" altLang="ko-KR" sz="2000" dirty="0"/>
-          </a:p>
-          <a:p>
-            <a:pPr marL="0" indent="0">
-              <a:buNone/>
-            </a:pPr>
-            <a:r>
-              <a:rPr lang="en-US" altLang="ko-KR" sz="2000" dirty="0"/>
-              <a:t>    </a:t>
-            </a:r>
-            <a:r>
-              <a:rPr lang="ko-KR" altLang="en-US" sz="2000" dirty="0"/>
-              <a:t>건물 내 랜덤하게 배치 될 것이며</a:t>
-            </a:r>
-            <a:endParaRPr lang="en-US" altLang="ko-KR" sz="2000" dirty="0"/>
-          </a:p>
-          <a:p>
-            <a:pPr marL="0" indent="0">
-              <a:buNone/>
-            </a:pPr>
-            <a:r>
-              <a:rPr lang="en-US" altLang="ko-KR" sz="2000" dirty="0"/>
-              <a:t>    </a:t>
-            </a:r>
-            <a:r>
-              <a:rPr lang="ko-KR" altLang="en-US" sz="2000" dirty="0"/>
-              <a:t>은신</a:t>
-            </a:r>
-            <a:r>
-              <a:rPr lang="en-US" altLang="ko-KR" sz="2000" dirty="0"/>
-              <a:t>, </a:t>
-            </a:r>
-            <a:r>
-              <a:rPr lang="ko-KR" altLang="en-US" sz="2000" dirty="0"/>
-              <a:t>장거리 </a:t>
-            </a:r>
-            <a:r>
-              <a:rPr lang="ko-KR" altLang="en-US" sz="2000" dirty="0" err="1"/>
-              <a:t>후레쉬</a:t>
-            </a:r>
-            <a:r>
-              <a:rPr lang="ko-KR" altLang="en-US" sz="2000" dirty="0"/>
-              <a:t> 등이 있다</a:t>
-            </a:r>
-            <a:endParaRPr lang="en-US" altLang="ko-KR" sz="2000" dirty="0"/>
-          </a:p>
-          <a:p>
-            <a:pPr marL="0" indent="0">
-              <a:buNone/>
-            </a:pPr>
-            <a:endParaRPr lang="en-US" altLang="ko-KR" sz="2000" dirty="0"/>
-          </a:p>
-          <a:p>
-            <a:pPr>
-              <a:buFontTx/>
-              <a:buChar char="-"/>
-            </a:pPr>
-            <a:r>
-              <a:rPr lang="ko-KR" altLang="en-US" sz="2000" dirty="0"/>
-              <a:t>좀비</a:t>
-            </a:r>
-            <a:endParaRPr lang="en-US" altLang="ko-KR" sz="2000" dirty="0"/>
-          </a:p>
-          <a:p>
-            <a:pPr marL="0" indent="0">
-              <a:buNone/>
-            </a:pPr>
-            <a:r>
-              <a:rPr lang="en-US" altLang="ko-KR" sz="2000" dirty="0"/>
-              <a:t>    </a:t>
-            </a:r>
-            <a:r>
-              <a:rPr lang="ko-KR" altLang="en-US" sz="2000" dirty="0"/>
-              <a:t>바이러스 변이가 </a:t>
-            </a:r>
-            <a:r>
-              <a:rPr lang="en-US" altLang="ko-KR" sz="2000" dirty="0"/>
-              <a:t> </a:t>
-            </a:r>
-            <a:r>
-              <a:rPr lang="ko-KR" altLang="en-US" sz="2000" dirty="0"/>
-              <a:t>여러 개가 있으므로 </a:t>
-            </a:r>
-            <a:endParaRPr lang="en-US" altLang="ko-KR" sz="2000" dirty="0"/>
-          </a:p>
-          <a:p>
-            <a:pPr marL="0" indent="0">
-              <a:buNone/>
-            </a:pPr>
-            <a:r>
-              <a:rPr lang="en-US" altLang="ko-KR" sz="2000" dirty="0"/>
-              <a:t>    </a:t>
-            </a:r>
-            <a:r>
-              <a:rPr lang="ko-KR" altLang="en-US" sz="2000" dirty="0"/>
-              <a:t>좀비의 능력이 다양하다</a:t>
-            </a:r>
-            <a:endParaRPr lang="en-US" altLang="ko-KR" sz="2000" dirty="0"/>
-          </a:p>
-          <a:p>
-            <a:pPr marL="0" indent="0">
-              <a:buNone/>
-            </a:pPr>
-            <a:r>
-              <a:rPr lang="en-US" altLang="ko-KR" sz="2000" dirty="0"/>
-              <a:t>    </a:t>
-            </a:r>
-            <a:r>
-              <a:rPr lang="ko-KR" altLang="en-US" sz="2000" dirty="0"/>
-              <a:t>소리에만 반응하거나 </a:t>
-            </a:r>
-            <a:r>
-              <a:rPr lang="ko-KR" altLang="en-US" sz="2000" dirty="0" err="1"/>
-              <a:t>후레쉬에만</a:t>
-            </a:r>
-            <a:r>
-              <a:rPr lang="ko-KR" altLang="en-US" sz="2000" dirty="0"/>
-              <a:t> 반응을 함 등</a:t>
-            </a:r>
-          </a:p>
-        </p:txBody>
-      </p:sp>
-      <p:pic>
-        <p:nvPicPr>
-          <p:cNvPr id="5" name="그림 4" descr="양초, 실내, 빛이(가) 표시된 사진&#10;&#10;AI 생성 콘텐츠는 정확하지 않을 수 있습니다.">
-            <a:extLst>
-              <a:ext uri="{FF2B5EF4-FFF2-40B4-BE49-F238E27FC236}">
-                <a16:creationId xmlns:a16="http://schemas.microsoft.com/office/drawing/2014/main" id="{5EA29A5E-A324-F5B0-5149-2EB8BE965647}"/>
-              </a:ext>
-            </a:extLst>
-          </p:cNvPr>
-          <p:cNvPicPr>
-            <a:picLocks noChangeAspect="1"/>
-          </p:cNvPicPr>
-          <p:nvPr/>
-        </p:nvPicPr>
-        <p:blipFill>
-          <a:blip r:embed="rId3">
-            <a:extLst>
-              <a:ext uri="{28A0092B-C50C-407E-A947-70E740481C1C}">
-                <a14:useLocalDpi xmlns:a14="http://schemas.microsoft.com/office/drawing/2010/main" val="0"/>
-              </a:ext>
-            </a:extLst>
-          </a:blip>
-          <a:stretch>
-            <a:fillRect/>
-          </a:stretch>
-        </p:blipFill>
-        <p:spPr>
-          <a:xfrm>
-            <a:off x="6096000" y="2564505"/>
-            <a:ext cx="964054" cy="1003041"/>
-          </a:xfrm>
-          <a:prstGeom prst="rect">
-            <a:avLst/>
-          </a:prstGeom>
-        </p:spPr>
-      </p:pic>
-    </p:spTree>
-    <p:extLst>
-      <p:ext uri="{BB962C8B-B14F-4D97-AF65-F5344CB8AC3E}">
-        <p14:creationId xmlns:p14="http://schemas.microsoft.com/office/powerpoint/2010/main" val="87467405"/>
-      </p:ext>
-    </p:extLst>
-  </p:cSld>
-  <p:clrMapOvr>
-    <a:masterClrMapping/>
-  </p:clrMapOvr>
-</p:sld>
-</file>
-
-<file path=ppt/slides/slide5.xml><?xml version="1.0" encoding="utf-8"?>
 <p:sld xmlns:a="http://schemas.openxmlformats.org/drawingml/2006/main" xmlns:r="http://schemas.openxmlformats.org/officeDocument/2006/relationships" xmlns:p="http://schemas.openxmlformats.org/presentationml/2006/main">
   <p:cSld>
     <p:spTree>
@@ -3973,7 +3125,15 @@
             </a:r>
             <a:r>
               <a:rPr lang="en-US" altLang="ko-KR" dirty="0"/>
-              <a:t>]</a:t>
+              <a:t>(</a:t>
+            </a:r>
+            <a:r>
+              <a:rPr lang="ko-KR" altLang="en-US" dirty="0"/>
+              <a:t>수정</a:t>
+            </a:r>
+            <a:r>
+              <a:rPr lang="en-US" altLang="ko-KR" dirty="0"/>
+              <a:t>)]</a:t>
             </a:r>
             <a:endParaRPr lang="ko-KR" altLang="en-US" dirty="0"/>
           </a:p>
@@ -4019,6 +3179,22 @@
               <a:rPr lang="ko-KR" altLang="en-US" sz="2000" dirty="0"/>
               <a:t>리소스 확보</a:t>
             </a:r>
+            <a:r>
+              <a:rPr lang="en-US" altLang="ko-KR" sz="2000" dirty="0"/>
+              <a:t>				-&gt; </a:t>
+            </a:r>
+            <a:r>
+              <a:rPr lang="ko-KR" altLang="en-US" sz="2000" dirty="0"/>
+              <a:t>리소스 확보</a:t>
+            </a:r>
+            <a:r>
+              <a:rPr lang="en-US" altLang="ko-KR" sz="2000" dirty="0"/>
+              <a:t>		=&gt; </a:t>
+            </a:r>
+            <a:r>
+              <a:rPr lang="ko-KR" altLang="en-US" sz="2000" dirty="0"/>
+              <a:t>완료</a:t>
+            </a:r>
             <a:endParaRPr lang="en-US" altLang="ko-KR" sz="2000" dirty="0"/>
           </a:p>
           <a:p>
@@ -4043,8 +3219,21 @@
             </a:r>
             <a:r>
               <a:rPr lang="en-US" altLang="ko-KR" sz="2000" dirty="0"/>
-              <a:t>(UI)</a:t>
-            </a:r>
+              <a:t>(UI)			-&gt; </a:t>
+            </a:r>
+            <a:r>
+              <a:rPr lang="ko-KR" altLang="en-US" sz="2000" dirty="0"/>
+              <a:t>게임 화면 세팅 </a:t>
+            </a:r>
+            <a:r>
+              <a:rPr lang="en-US" altLang="ko-KR" sz="2000" dirty="0"/>
+              <a:t>	=&gt; </a:t>
+            </a:r>
+            <a:r>
+              <a:rPr lang="ko-KR" altLang="en-US" sz="2000" dirty="0"/>
+              <a:t>완료</a:t>
+            </a:r>
+            <a:endParaRPr lang="en-US" altLang="ko-KR" sz="2000" dirty="0"/>
           </a:p>
           <a:p>
             <a:pPr marL="0" indent="0">
@@ -4074,6 +3263,22 @@
               <a:rPr lang="ko-KR" altLang="en-US" sz="2000" dirty="0"/>
               <a:t>맵 구현</a:t>
             </a:r>
+            <a:r>
+              <a:rPr lang="en-US" altLang="ko-KR" sz="2000" dirty="0"/>
+              <a:t>				-&gt; </a:t>
+            </a:r>
+            <a:r>
+              <a:rPr lang="ko-KR" altLang="en-US" sz="2000" dirty="0"/>
+              <a:t>맵 구현</a:t>
+            </a:r>
+            <a:r>
+              <a:rPr lang="en-US" altLang="ko-KR" sz="2000" dirty="0"/>
+              <a:t>		=&gt; 50% </a:t>
+            </a:r>
+            <a:r>
+              <a:rPr lang="ko-KR" altLang="en-US" sz="2000" dirty="0"/>
+              <a:t>완료</a:t>
+            </a:r>
             <a:endParaRPr lang="en-US" altLang="ko-KR" sz="2000" dirty="0"/>
           </a:p>
           <a:p>
@@ -4104,6 +3309,22 @@
               <a:rPr lang="ko-KR" altLang="en-US" sz="2000" dirty="0"/>
               <a:t>이동 구현</a:t>
             </a:r>
+            <a:r>
+              <a:rPr lang="en-US" altLang="ko-KR" sz="2000" dirty="0"/>
+              <a:t>				-&gt; </a:t>
+            </a:r>
+            <a:r>
+              <a:rPr lang="ko-KR" altLang="en-US" sz="2000" dirty="0"/>
+              <a:t>캐릭터 구현</a:t>
+            </a:r>
+            <a:r>
+              <a:rPr lang="en-US" altLang="ko-KR" sz="2000" dirty="0"/>
+              <a:t>		=&gt; 50% </a:t>
+            </a:r>
+            <a:r>
+              <a:rPr lang="ko-KR" altLang="en-US" sz="2000" dirty="0"/>
+              <a:t>완료</a:t>
+            </a:r>
             <a:endParaRPr lang="en-US" altLang="ko-KR" sz="2000" dirty="0"/>
           </a:p>
           <a:p>
@@ -4128,21 +3349,24 @@
             </a:r>
             <a:r>
               <a:rPr lang="en-US" altLang="ko-KR" sz="2000" dirty="0"/>
-              <a:t> </a:t>
-            </a:r>
-            <a:r>
-              <a:rPr lang="en-US" altLang="ko-KR" sz="2000"/>
-              <a:t>+ </a:t>
-            </a:r>
-            <a:r>
-              <a:rPr lang="ko-KR" altLang="en-US" sz="2000"/>
-              <a:t>스킬의 </a:t>
+              <a:t> + </a:t>
             </a:r>
             <a:r>
               <a:rPr lang="ko-KR" altLang="en-US" sz="2000" dirty="0"/>
-              <a:t>효과 구현</a:t>
-            </a:r>
-            <a:endParaRPr lang="en-US" altLang="ko-KR" sz="2000" dirty="0"/>
+              <a:t>스킬의 효과 구현</a:t>
+            </a:r>
+            <a:r>
+              <a:rPr lang="en-US" altLang="ko-KR" sz="2000" dirty="0"/>
+              <a:t>	-&gt; </a:t>
+            </a:r>
+            <a:r>
+              <a:rPr lang="ko-KR" altLang="en-US" sz="2000" dirty="0"/>
+              <a:t>좀비 구현 </a:t>
+            </a:r>
+            <a:r>
+              <a:rPr lang="en-US" altLang="ko-KR" sz="2000" dirty="0"/>
+              <a:t>		</a:t>
+            </a:r>
           </a:p>
           <a:p>
             <a:pPr marL="0" indent="0">
@@ -4172,6 +3396,14 @@
               <a:rPr lang="ko-KR" altLang="en-US" sz="2000" dirty="0"/>
               <a:t>판정 구현</a:t>
             </a:r>
+            <a:r>
+              <a:rPr lang="en-US" altLang="ko-KR" sz="2000" dirty="0"/>
+              <a:t>			-&gt; </a:t>
+            </a:r>
+            <a:r>
+              <a:rPr lang="ko-KR" altLang="en-US" sz="2000" dirty="0"/>
+              <a:t>스킬 구현</a:t>
+            </a:r>
             <a:endParaRPr lang="en-US" altLang="ko-KR" sz="2000" dirty="0"/>
           </a:p>
           <a:p>
@@ -4194,6 +3426,22 @@
               <a:rPr lang="ko-KR" altLang="en-US" sz="2000" dirty="0"/>
               <a:t>소리 구현</a:t>
             </a:r>
+            <a:r>
+              <a:rPr lang="en-US" altLang="ko-KR" sz="2000" dirty="0"/>
+              <a:t>				-&gt; </a:t>
+            </a:r>
+            <a:r>
+              <a:rPr lang="ko-KR" altLang="en-US" sz="2000" dirty="0"/>
+              <a:t>소리 </a:t>
+            </a:r>
+            <a:r>
+              <a:rPr lang="en-US" altLang="ko-KR" sz="2000" dirty="0"/>
+              <a:t>+ </a:t>
+            </a:r>
+            <a:r>
+              <a:rPr lang="ko-KR" altLang="en-US" sz="2000" dirty="0"/>
+              <a:t>승리 판정 구현</a:t>
+            </a:r>
             <a:endParaRPr lang="en-US" altLang="ko-KR" sz="2000" dirty="0"/>
           </a:p>
           <a:p>
@@ -4216,6 +3464,14 @@
               <a:rPr lang="ko-KR" altLang="en-US" sz="2000" dirty="0"/>
               <a:t>플레이 해보면서 밸런스 조정</a:t>
             </a:r>
+            <a:r>
+              <a:rPr lang="en-US" altLang="ko-KR" sz="2000" dirty="0"/>
+              <a:t>		-&gt; </a:t>
+            </a:r>
+            <a:r>
+              <a:rPr lang="ko-KR" altLang="en-US" sz="2000" dirty="0"/>
+              <a:t>밸런스 조정</a:t>
+            </a:r>
             <a:endParaRPr lang="en-US" altLang="ko-KR" sz="2000" dirty="0"/>
           </a:p>
           <a:p>
@@ -4233,6 +3489,14 @@
             <a:r>
               <a:rPr lang="en-US" altLang="ko-KR" sz="2000" dirty="0"/>
               <a:t>: </a:t>
+            </a:r>
+            <a:r>
+              <a:rPr lang="ko-KR" altLang="en-US" sz="2000" dirty="0"/>
+              <a:t>발표 준비</a:t>
+            </a:r>
+            <a:r>
+              <a:rPr lang="en-US" altLang="ko-KR" sz="2000" dirty="0"/>
+              <a:t>				-&gt; </a:t>
             </a:r>
             <a:r>
               <a:rPr lang="ko-KR" altLang="en-US" sz="2000" dirty="0"/>

</xml_diff>